<commit_message>
Lack of Introduction and Excutive summary
</commit_message>
<xml_diff>
--- a/Presentation1.pptx
+++ b/Presentation1.pptx
@@ -9,7 +9,7 @@
     <p:sldId id="257" r:id="rId3"/>
     <p:sldId id="258" r:id="rId4"/>
     <p:sldId id="259" r:id="rId5"/>
-    <p:sldId id="260" r:id="rId6"/>
+    <p:sldId id="262" r:id="rId6"/>
     <p:sldId id="261" r:id="rId7"/>
   </p:sldIdLst>
   <p:sldSz cx="9144000" cy="6858000" type="screen4x3"/>
@@ -293,7 +293,7 @@
           <a:p>
             <a:fld id="{2399705D-5885-43B7-BB49-28F53D9E2A05}" type="datetimeFigureOut">
               <a:rPr lang="en-AU" smtClean="0"/>
-              <a:t>12/09/2017</a:t>
+              <a:t>14/09/2017</a:t>
             </a:fld>
             <a:endParaRPr lang="en-AU"/>
           </a:p>
@@ -463,7 +463,7 @@
           <a:p>
             <a:fld id="{2399705D-5885-43B7-BB49-28F53D9E2A05}" type="datetimeFigureOut">
               <a:rPr lang="en-AU" smtClean="0"/>
-              <a:t>12/09/2017</a:t>
+              <a:t>14/09/2017</a:t>
             </a:fld>
             <a:endParaRPr lang="en-AU"/>
           </a:p>
@@ -643,7 +643,7 @@
           <a:p>
             <a:fld id="{2399705D-5885-43B7-BB49-28F53D9E2A05}" type="datetimeFigureOut">
               <a:rPr lang="en-AU" smtClean="0"/>
-              <a:t>12/09/2017</a:t>
+              <a:t>14/09/2017</a:t>
             </a:fld>
             <a:endParaRPr lang="en-AU"/>
           </a:p>
@@ -813,7 +813,7 @@
           <a:p>
             <a:fld id="{2399705D-5885-43B7-BB49-28F53D9E2A05}" type="datetimeFigureOut">
               <a:rPr lang="en-AU" smtClean="0"/>
-              <a:t>12/09/2017</a:t>
+              <a:t>14/09/2017</a:t>
             </a:fld>
             <a:endParaRPr lang="en-AU"/>
           </a:p>
@@ -1059,7 +1059,7 @@
           <a:p>
             <a:fld id="{2399705D-5885-43B7-BB49-28F53D9E2A05}" type="datetimeFigureOut">
               <a:rPr lang="en-AU" smtClean="0"/>
-              <a:t>12/09/2017</a:t>
+              <a:t>14/09/2017</a:t>
             </a:fld>
             <a:endParaRPr lang="en-AU"/>
           </a:p>
@@ -1347,7 +1347,7 @@
           <a:p>
             <a:fld id="{2399705D-5885-43B7-BB49-28F53D9E2A05}" type="datetimeFigureOut">
               <a:rPr lang="en-AU" smtClean="0"/>
-              <a:t>12/09/2017</a:t>
+              <a:t>14/09/2017</a:t>
             </a:fld>
             <a:endParaRPr lang="en-AU"/>
           </a:p>
@@ -1769,7 +1769,7 @@
           <a:p>
             <a:fld id="{2399705D-5885-43B7-BB49-28F53D9E2A05}" type="datetimeFigureOut">
               <a:rPr lang="en-AU" smtClean="0"/>
-              <a:t>12/09/2017</a:t>
+              <a:t>14/09/2017</a:t>
             </a:fld>
             <a:endParaRPr lang="en-AU"/>
           </a:p>
@@ -1887,7 +1887,7 @@
           <a:p>
             <a:fld id="{2399705D-5885-43B7-BB49-28F53D9E2A05}" type="datetimeFigureOut">
               <a:rPr lang="en-AU" smtClean="0"/>
-              <a:t>12/09/2017</a:t>
+              <a:t>14/09/2017</a:t>
             </a:fld>
             <a:endParaRPr lang="en-AU"/>
           </a:p>
@@ -1982,7 +1982,7 @@
           <a:p>
             <a:fld id="{2399705D-5885-43B7-BB49-28F53D9E2A05}" type="datetimeFigureOut">
               <a:rPr lang="en-AU" smtClean="0"/>
-              <a:t>12/09/2017</a:t>
+              <a:t>14/09/2017</a:t>
             </a:fld>
             <a:endParaRPr lang="en-AU"/>
           </a:p>
@@ -2259,7 +2259,7 @@
           <a:p>
             <a:fld id="{2399705D-5885-43B7-BB49-28F53D9E2A05}" type="datetimeFigureOut">
               <a:rPr lang="en-AU" smtClean="0"/>
-              <a:t>12/09/2017</a:t>
+              <a:t>14/09/2017</a:t>
             </a:fld>
             <a:endParaRPr lang="en-AU"/>
           </a:p>
@@ -2512,7 +2512,7 @@
           <a:p>
             <a:fld id="{2399705D-5885-43B7-BB49-28F53D9E2A05}" type="datetimeFigureOut">
               <a:rPr lang="en-AU" smtClean="0"/>
-              <a:t>12/09/2017</a:t>
+              <a:t>14/09/2017</a:t>
             </a:fld>
             <a:endParaRPr lang="en-AU"/>
           </a:p>
@@ -2725,7 +2725,7 @@
           <a:p>
             <a:fld id="{2399705D-5885-43B7-BB49-28F53D9E2A05}" type="datetimeFigureOut">
               <a:rPr lang="en-AU" smtClean="0"/>
-              <a:t>12/09/2017</a:t>
+              <a:t>14/09/2017</a:t>
             </a:fld>
             <a:endParaRPr lang="en-AU"/>
           </a:p>
@@ -5454,7 +5454,7 @@
         </p:blipFill>
         <p:spPr bwMode="auto">
           <a:xfrm>
-            <a:off x="-108520" y="332656"/>
+            <a:off x="-159330" y="333530"/>
             <a:ext cx="9937104" cy="6832734"/>
           </a:xfrm>
           <a:prstGeom prst="rect">
@@ -5485,6 +5485,719 @@
           </a:extLst>
         </p:spPr>
       </p:pic>
+      <p:sp>
+        <p:nvSpPr>
+          <p:cNvPr id="2" name="TextBox 1"/>
+          <p:cNvSpPr txBox="1"/>
+          <p:nvPr/>
+        </p:nvSpPr>
+        <p:spPr>
+          <a:xfrm>
+            <a:off x="1403648" y="2204864"/>
+            <a:ext cx="792088" cy="646331"/>
+          </a:xfrm>
+          <a:prstGeom prst="rect">
+            <a:avLst/>
+          </a:prstGeom>
+          <a:noFill/>
+        </p:spPr>
+        <p:txBody>
+          <a:bodyPr wrap="square" rtlCol="0">
+            <a:spAutoFit/>
+          </a:bodyPr>
+          <a:lstStyle/>
+          <a:p>
+            <a:r>
+              <a:rPr lang="en-AU" dirty="0" smtClean="0"/>
+              <a:t>Room T.0.6</a:t>
+            </a:r>
+          </a:p>
+        </p:txBody>
+      </p:sp>
+      <p:sp>
+        <p:nvSpPr>
+          <p:cNvPr id="3" name="Oval 2"/>
+          <p:cNvSpPr/>
+          <p:nvPr/>
+        </p:nvSpPr>
+        <p:spPr>
+          <a:xfrm>
+            <a:off x="5923060" y="4085618"/>
+            <a:ext cx="45719" cy="45719"/>
+          </a:xfrm>
+          <a:prstGeom prst="ellipse">
+            <a:avLst/>
+          </a:prstGeom>
+        </p:spPr>
+        <p:style>
+          <a:lnRef idx="2">
+            <a:schemeClr val="accent1">
+              <a:shade val="50000"/>
+            </a:schemeClr>
+          </a:lnRef>
+          <a:fillRef idx="1">
+            <a:schemeClr val="accent1"/>
+          </a:fillRef>
+          <a:effectRef idx="0">
+            <a:schemeClr val="accent1"/>
+          </a:effectRef>
+          <a:fontRef idx="minor">
+            <a:schemeClr val="lt1"/>
+          </a:fontRef>
+        </p:style>
+        <p:txBody>
+          <a:bodyPr rtlCol="0" anchor="ctr"/>
+          <a:lstStyle/>
+          <a:p>
+            <a:pPr algn="ctr"/>
+            <a:endParaRPr lang="en-AU"/>
+          </a:p>
+        </p:txBody>
+      </p:sp>
+      <p:sp>
+        <p:nvSpPr>
+          <p:cNvPr id="4" name="TextBox 3"/>
+          <p:cNvSpPr txBox="1"/>
+          <p:nvPr/>
+        </p:nvSpPr>
+        <p:spPr>
+          <a:xfrm>
+            <a:off x="5618362" y="3833494"/>
+            <a:ext cx="360040" cy="261610"/>
+          </a:xfrm>
+          <a:prstGeom prst="rect">
+            <a:avLst/>
+          </a:prstGeom>
+          <a:noFill/>
+        </p:spPr>
+        <p:txBody>
+          <a:bodyPr wrap="square" rtlCol="0">
+            <a:spAutoFit/>
+          </a:bodyPr>
+          <a:lstStyle/>
+          <a:p>
+            <a:r>
+              <a:rPr lang="en-AU" sz="1100" dirty="0" smtClean="0">
+                <a:solidFill>
+                  <a:schemeClr val="tx2"/>
+                </a:solidFill>
+              </a:rPr>
+              <a:t>OA</a:t>
+            </a:r>
+            <a:endParaRPr lang="en-AU" sz="1100" dirty="0">
+              <a:solidFill>
+                <a:schemeClr val="tx2"/>
+              </a:solidFill>
+            </a:endParaRPr>
+          </a:p>
+        </p:txBody>
+      </p:sp>
+      <p:sp>
+        <p:nvSpPr>
+          <p:cNvPr id="5" name="Oval 4"/>
+          <p:cNvSpPr/>
+          <p:nvPr/>
+        </p:nvSpPr>
+        <p:spPr>
+          <a:xfrm>
+            <a:off x="4238249" y="4644590"/>
+            <a:ext cx="45719" cy="45719"/>
+          </a:xfrm>
+          <a:prstGeom prst="ellipse">
+            <a:avLst/>
+          </a:prstGeom>
+        </p:spPr>
+        <p:style>
+          <a:lnRef idx="2">
+            <a:schemeClr val="accent1">
+              <a:shade val="50000"/>
+            </a:schemeClr>
+          </a:lnRef>
+          <a:fillRef idx="1">
+            <a:schemeClr val="accent1"/>
+          </a:fillRef>
+          <a:effectRef idx="0">
+            <a:schemeClr val="accent1"/>
+          </a:effectRef>
+          <a:fontRef idx="minor">
+            <a:schemeClr val="lt1"/>
+          </a:fontRef>
+        </p:style>
+        <p:txBody>
+          <a:bodyPr rtlCol="0" anchor="ctr"/>
+          <a:lstStyle/>
+          <a:p>
+            <a:pPr algn="ctr"/>
+            <a:endParaRPr lang="en-AU"/>
+          </a:p>
+        </p:txBody>
+      </p:sp>
+      <p:sp>
+        <p:nvSpPr>
+          <p:cNvPr id="8" name="TextBox 7"/>
+          <p:cNvSpPr txBox="1"/>
+          <p:nvPr/>
+        </p:nvSpPr>
+        <p:spPr>
+          <a:xfrm>
+            <a:off x="3936261" y="4405070"/>
+            <a:ext cx="360040" cy="261610"/>
+          </a:xfrm>
+          <a:prstGeom prst="rect">
+            <a:avLst/>
+          </a:prstGeom>
+          <a:noFill/>
+        </p:spPr>
+        <p:txBody>
+          <a:bodyPr wrap="square" rtlCol="0">
+            <a:spAutoFit/>
+          </a:bodyPr>
+          <a:lstStyle/>
+          <a:p>
+            <a:r>
+              <a:rPr lang="en-AU" sz="1100" dirty="0">
+                <a:solidFill>
+                  <a:schemeClr val="tx2"/>
+                </a:solidFill>
+              </a:rPr>
+              <a:t>R</a:t>
+            </a:r>
+            <a:r>
+              <a:rPr lang="en-AU" sz="1100" dirty="0" smtClean="0">
+                <a:solidFill>
+                  <a:schemeClr val="tx2"/>
+                </a:solidFill>
+              </a:rPr>
+              <a:t>A</a:t>
+            </a:r>
+            <a:endParaRPr lang="en-AU" sz="1100" dirty="0">
+              <a:solidFill>
+                <a:schemeClr val="tx2"/>
+              </a:solidFill>
+            </a:endParaRPr>
+          </a:p>
+        </p:txBody>
+      </p:sp>
+      <p:cxnSp>
+        <p:nvCxnSpPr>
+          <p:cNvPr id="9" name="Straight Connector 8"/>
+          <p:cNvCxnSpPr/>
+          <p:nvPr/>
+        </p:nvCxnSpPr>
+        <p:spPr>
+          <a:xfrm flipV="1">
+            <a:off x="4499992" y="3749897"/>
+            <a:ext cx="4968552" cy="916783"/>
+          </a:xfrm>
+          <a:prstGeom prst="line">
+            <a:avLst/>
+          </a:prstGeom>
+        </p:spPr>
+        <p:style>
+          <a:lnRef idx="1">
+            <a:schemeClr val="accent1"/>
+          </a:lnRef>
+          <a:fillRef idx="0">
+            <a:schemeClr val="accent1"/>
+          </a:fillRef>
+          <a:effectRef idx="0">
+            <a:schemeClr val="accent1"/>
+          </a:effectRef>
+          <a:fontRef idx="minor">
+            <a:schemeClr val="tx1"/>
+          </a:fontRef>
+        </p:style>
+      </p:cxnSp>
+      <p:sp>
+        <p:nvSpPr>
+          <p:cNvPr id="11" name="TextBox 10"/>
+          <p:cNvSpPr txBox="1"/>
+          <p:nvPr/>
+        </p:nvSpPr>
+        <p:spPr>
+          <a:xfrm rot="20880603">
+            <a:off x="8685308" y="3554589"/>
+            <a:ext cx="936612" cy="261610"/>
+          </a:xfrm>
+          <a:prstGeom prst="rect">
+            <a:avLst/>
+          </a:prstGeom>
+          <a:noFill/>
+        </p:spPr>
+        <p:txBody>
+          <a:bodyPr wrap="square" rtlCol="0">
+            <a:spAutoFit/>
+          </a:bodyPr>
+          <a:lstStyle/>
+          <a:p>
+            <a:r>
+              <a:rPr lang="en-AU" sz="1100" dirty="0" smtClean="0">
+                <a:solidFill>
+                  <a:schemeClr val="tx2"/>
+                </a:solidFill>
+              </a:rPr>
+              <a:t>SHF = 0.72</a:t>
+            </a:r>
+            <a:endParaRPr lang="en-AU" sz="1100" dirty="0">
+              <a:solidFill>
+                <a:schemeClr val="tx2"/>
+              </a:solidFill>
+            </a:endParaRPr>
+          </a:p>
+        </p:txBody>
+      </p:sp>
+      <p:cxnSp>
+        <p:nvCxnSpPr>
+          <p:cNvPr id="14" name="Straight Connector 13"/>
+          <p:cNvCxnSpPr/>
+          <p:nvPr/>
+        </p:nvCxnSpPr>
+        <p:spPr>
+          <a:xfrm flipV="1">
+            <a:off x="1835696" y="4672539"/>
+            <a:ext cx="2425412" cy="458390"/>
+          </a:xfrm>
+          <a:prstGeom prst="line">
+            <a:avLst/>
+          </a:prstGeom>
+        </p:spPr>
+        <p:style>
+          <a:lnRef idx="1">
+            <a:schemeClr val="accent2"/>
+          </a:lnRef>
+          <a:fillRef idx="0">
+            <a:schemeClr val="accent2"/>
+          </a:fillRef>
+          <a:effectRef idx="0">
+            <a:schemeClr val="accent2"/>
+          </a:effectRef>
+          <a:fontRef idx="minor">
+            <a:schemeClr val="tx1"/>
+          </a:fontRef>
+        </p:style>
+      </p:cxnSp>
+      <p:sp>
+        <p:nvSpPr>
+          <p:cNvPr id="16" name="Oval 15"/>
+          <p:cNvSpPr/>
+          <p:nvPr/>
+        </p:nvSpPr>
+        <p:spPr>
+          <a:xfrm>
+            <a:off x="2366041" y="4996735"/>
+            <a:ext cx="45719" cy="45719"/>
+          </a:xfrm>
+          <a:prstGeom prst="ellipse">
+            <a:avLst/>
+          </a:prstGeom>
+        </p:spPr>
+        <p:style>
+          <a:lnRef idx="2">
+            <a:schemeClr val="accent1">
+              <a:shade val="50000"/>
+            </a:schemeClr>
+          </a:lnRef>
+          <a:fillRef idx="1">
+            <a:schemeClr val="accent1"/>
+          </a:fillRef>
+          <a:effectRef idx="0">
+            <a:schemeClr val="accent1"/>
+          </a:effectRef>
+          <a:fontRef idx="minor">
+            <a:schemeClr val="lt1"/>
+          </a:fontRef>
+        </p:style>
+        <p:txBody>
+          <a:bodyPr rtlCol="0" anchor="ctr"/>
+          <a:lstStyle/>
+          <a:p>
+            <a:pPr algn="ctr"/>
+            <a:endParaRPr lang="en-AU"/>
+          </a:p>
+        </p:txBody>
+      </p:sp>
+      <p:sp>
+        <p:nvSpPr>
+          <p:cNvPr id="17" name="TextBox 16"/>
+          <p:cNvSpPr txBox="1"/>
+          <p:nvPr/>
+        </p:nvSpPr>
+        <p:spPr>
+          <a:xfrm>
+            <a:off x="2411760" y="4996979"/>
+            <a:ext cx="360040" cy="261610"/>
+          </a:xfrm>
+          <a:prstGeom prst="rect">
+            <a:avLst/>
+          </a:prstGeom>
+          <a:noFill/>
+        </p:spPr>
+        <p:txBody>
+          <a:bodyPr wrap="square" rtlCol="0">
+            <a:spAutoFit/>
+          </a:bodyPr>
+          <a:lstStyle/>
+          <a:p>
+            <a:r>
+              <a:rPr lang="en-AU" sz="1100" dirty="0">
+                <a:solidFill>
+                  <a:schemeClr val="tx2"/>
+                </a:solidFill>
+              </a:rPr>
+              <a:t>S</a:t>
+            </a:r>
+            <a:r>
+              <a:rPr lang="en-AU" sz="1100" dirty="0" smtClean="0">
+                <a:solidFill>
+                  <a:schemeClr val="tx2"/>
+                </a:solidFill>
+              </a:rPr>
+              <a:t>A</a:t>
+            </a:r>
+            <a:endParaRPr lang="en-AU" sz="1100" dirty="0">
+              <a:solidFill>
+                <a:schemeClr val="tx2"/>
+              </a:solidFill>
+            </a:endParaRPr>
+          </a:p>
+        </p:txBody>
+      </p:sp>
+      <p:cxnSp>
+        <p:nvCxnSpPr>
+          <p:cNvPr id="18" name="Straight Connector 17"/>
+          <p:cNvCxnSpPr/>
+          <p:nvPr/>
+        </p:nvCxnSpPr>
+        <p:spPr>
+          <a:xfrm flipV="1">
+            <a:off x="4275422" y="4108478"/>
+            <a:ext cx="1684811" cy="558972"/>
+          </a:xfrm>
+          <a:prstGeom prst="line">
+            <a:avLst/>
+          </a:prstGeom>
+        </p:spPr>
+        <p:style>
+          <a:lnRef idx="1">
+            <a:schemeClr val="accent2"/>
+          </a:lnRef>
+          <a:fillRef idx="0">
+            <a:schemeClr val="accent2"/>
+          </a:fillRef>
+          <a:effectRef idx="0">
+            <a:schemeClr val="accent2"/>
+          </a:effectRef>
+          <a:fontRef idx="minor">
+            <a:schemeClr val="tx1"/>
+          </a:fontRef>
+        </p:style>
+      </p:cxnSp>
+      <p:sp>
+        <p:nvSpPr>
+          <p:cNvPr id="20" name="Oval 19"/>
+          <p:cNvSpPr/>
+          <p:nvPr/>
+        </p:nvSpPr>
+        <p:spPr>
+          <a:xfrm>
+            <a:off x="4958329" y="4420020"/>
+            <a:ext cx="45719" cy="45719"/>
+          </a:xfrm>
+          <a:prstGeom prst="ellipse">
+            <a:avLst/>
+          </a:prstGeom>
+        </p:spPr>
+        <p:style>
+          <a:lnRef idx="2">
+            <a:schemeClr val="accent1">
+              <a:shade val="50000"/>
+            </a:schemeClr>
+          </a:lnRef>
+          <a:fillRef idx="1">
+            <a:schemeClr val="accent1"/>
+          </a:fillRef>
+          <a:effectRef idx="0">
+            <a:schemeClr val="accent1"/>
+          </a:effectRef>
+          <a:fontRef idx="minor">
+            <a:schemeClr val="lt1"/>
+          </a:fontRef>
+        </p:style>
+        <p:txBody>
+          <a:bodyPr rtlCol="0" anchor="ctr"/>
+          <a:lstStyle/>
+          <a:p>
+            <a:pPr algn="ctr"/>
+            <a:endParaRPr lang="en-AU"/>
+          </a:p>
+        </p:txBody>
+      </p:sp>
+      <p:sp>
+        <p:nvSpPr>
+          <p:cNvPr id="21" name="TextBox 20"/>
+          <p:cNvSpPr txBox="1"/>
+          <p:nvPr/>
+        </p:nvSpPr>
+        <p:spPr>
+          <a:xfrm>
+            <a:off x="4834422" y="4108477"/>
+            <a:ext cx="457658" cy="261610"/>
+          </a:xfrm>
+          <a:prstGeom prst="rect">
+            <a:avLst/>
+          </a:prstGeom>
+          <a:noFill/>
+        </p:spPr>
+        <p:txBody>
+          <a:bodyPr wrap="square" rtlCol="0">
+            <a:spAutoFit/>
+          </a:bodyPr>
+          <a:lstStyle/>
+          <a:p>
+            <a:r>
+              <a:rPr lang="en-AU" sz="1100" dirty="0" smtClean="0">
+                <a:solidFill>
+                  <a:schemeClr val="tx2"/>
+                </a:solidFill>
+              </a:rPr>
+              <a:t>Mix</a:t>
+            </a:r>
+            <a:endParaRPr lang="en-AU" sz="1100" dirty="0">
+              <a:solidFill>
+                <a:schemeClr val="tx2"/>
+              </a:solidFill>
+            </a:endParaRPr>
+          </a:p>
+        </p:txBody>
+      </p:sp>
+      <p:sp>
+        <p:nvSpPr>
+          <p:cNvPr id="22" name="Oval 21"/>
+          <p:cNvSpPr/>
+          <p:nvPr/>
+        </p:nvSpPr>
+        <p:spPr>
+          <a:xfrm>
+            <a:off x="2051720" y="5085184"/>
+            <a:ext cx="45719" cy="45719"/>
+          </a:xfrm>
+          <a:prstGeom prst="ellipse">
+            <a:avLst/>
+          </a:prstGeom>
+        </p:spPr>
+        <p:style>
+          <a:lnRef idx="2">
+            <a:schemeClr val="accent1">
+              <a:shade val="50000"/>
+            </a:schemeClr>
+          </a:lnRef>
+          <a:fillRef idx="1">
+            <a:schemeClr val="accent1"/>
+          </a:fillRef>
+          <a:effectRef idx="0">
+            <a:schemeClr val="accent1"/>
+          </a:effectRef>
+          <a:fontRef idx="minor">
+            <a:schemeClr val="lt1"/>
+          </a:fontRef>
+        </p:style>
+        <p:txBody>
+          <a:bodyPr rtlCol="0" anchor="ctr"/>
+          <a:lstStyle/>
+          <a:p>
+            <a:pPr algn="ctr"/>
+            <a:endParaRPr lang="en-AU"/>
+          </a:p>
+        </p:txBody>
+      </p:sp>
+      <p:sp>
+        <p:nvSpPr>
+          <p:cNvPr id="23" name="TextBox 22"/>
+          <p:cNvSpPr txBox="1"/>
+          <p:nvPr/>
+        </p:nvSpPr>
+        <p:spPr>
+          <a:xfrm>
+            <a:off x="1917419" y="5132431"/>
+            <a:ext cx="448622" cy="261610"/>
+          </a:xfrm>
+          <a:prstGeom prst="rect">
+            <a:avLst/>
+          </a:prstGeom>
+          <a:noFill/>
+        </p:spPr>
+        <p:txBody>
+          <a:bodyPr wrap="square" rtlCol="0">
+            <a:spAutoFit/>
+          </a:bodyPr>
+          <a:lstStyle/>
+          <a:p>
+            <a:r>
+              <a:rPr lang="en-AU" sz="1100" dirty="0" smtClean="0">
+                <a:solidFill>
+                  <a:schemeClr val="tx2"/>
+                </a:solidFill>
+              </a:rPr>
+              <a:t>ADP</a:t>
+            </a:r>
+            <a:endParaRPr lang="en-AU" sz="1100" dirty="0">
+              <a:solidFill>
+                <a:schemeClr val="tx2"/>
+              </a:solidFill>
+            </a:endParaRPr>
+          </a:p>
+        </p:txBody>
+      </p:sp>
+      <p:cxnSp>
+        <p:nvCxnSpPr>
+          <p:cNvPr id="24" name="Straight Connector 23"/>
+          <p:cNvCxnSpPr/>
+          <p:nvPr/>
+        </p:nvCxnSpPr>
+        <p:spPr>
+          <a:xfrm flipV="1">
+            <a:off x="2383133" y="4427915"/>
+            <a:ext cx="2610580" cy="576715"/>
+          </a:xfrm>
+          <a:prstGeom prst="line">
+            <a:avLst/>
+          </a:prstGeom>
+        </p:spPr>
+        <p:style>
+          <a:lnRef idx="1">
+            <a:schemeClr val="accent2"/>
+          </a:lnRef>
+          <a:fillRef idx="0">
+            <a:schemeClr val="accent2"/>
+          </a:fillRef>
+          <a:effectRef idx="0">
+            <a:schemeClr val="accent2"/>
+          </a:effectRef>
+          <a:fontRef idx="minor">
+            <a:schemeClr val="tx1"/>
+          </a:fontRef>
+        </p:style>
+      </p:cxnSp>
+      <p:cxnSp>
+        <p:nvCxnSpPr>
+          <p:cNvPr id="28" name="Straight Connector 27"/>
+          <p:cNvCxnSpPr/>
+          <p:nvPr/>
+        </p:nvCxnSpPr>
+        <p:spPr>
+          <a:xfrm flipH="1" flipV="1">
+            <a:off x="2555778" y="3310622"/>
+            <a:ext cx="792086" cy="383318"/>
+          </a:xfrm>
+          <a:prstGeom prst="line">
+            <a:avLst/>
+          </a:prstGeom>
+        </p:spPr>
+        <p:style>
+          <a:lnRef idx="1">
+            <a:schemeClr val="accent1"/>
+          </a:lnRef>
+          <a:fillRef idx="0">
+            <a:schemeClr val="accent1"/>
+          </a:fillRef>
+          <a:effectRef idx="0">
+            <a:schemeClr val="accent1"/>
+          </a:effectRef>
+          <a:fontRef idx="minor">
+            <a:schemeClr val="tx1"/>
+          </a:fontRef>
+        </p:style>
+      </p:cxnSp>
+      <p:cxnSp>
+        <p:nvCxnSpPr>
+          <p:cNvPr id="32" name="Straight Connector 31"/>
+          <p:cNvCxnSpPr/>
+          <p:nvPr/>
+        </p:nvCxnSpPr>
+        <p:spPr>
+          <a:xfrm flipH="1" flipV="1">
+            <a:off x="1259634" y="4464732"/>
+            <a:ext cx="792086" cy="383318"/>
+          </a:xfrm>
+          <a:prstGeom prst="line">
+            <a:avLst/>
+          </a:prstGeom>
+        </p:spPr>
+        <p:style>
+          <a:lnRef idx="1">
+            <a:schemeClr val="accent1"/>
+          </a:lnRef>
+          <a:fillRef idx="0">
+            <a:schemeClr val="accent1"/>
+          </a:fillRef>
+          <a:effectRef idx="0">
+            <a:schemeClr val="accent1"/>
+          </a:effectRef>
+          <a:fontRef idx="minor">
+            <a:schemeClr val="tx1"/>
+          </a:fontRef>
+        </p:style>
+      </p:cxnSp>
+      <p:sp>
+        <p:nvSpPr>
+          <p:cNvPr id="31" name="TextBox 30"/>
+          <p:cNvSpPr txBox="1"/>
+          <p:nvPr/>
+        </p:nvSpPr>
+        <p:spPr>
+          <a:xfrm rot="1549240">
+            <a:off x="1396008" y="4412764"/>
+            <a:ext cx="657785" cy="246221"/>
+          </a:xfrm>
+          <a:prstGeom prst="rect">
+            <a:avLst/>
+          </a:prstGeom>
+          <a:noFill/>
+        </p:spPr>
+        <p:txBody>
+          <a:bodyPr wrap="square" rtlCol="0">
+            <a:spAutoFit/>
+          </a:bodyPr>
+          <a:lstStyle/>
+          <a:p>
+            <a:r>
+              <a:rPr lang="en-AU" sz="1000" dirty="0" smtClean="0"/>
+              <a:t>33kJ/kg</a:t>
+            </a:r>
+            <a:endParaRPr lang="en-AU" sz="1000" dirty="0"/>
+          </a:p>
+        </p:txBody>
+      </p:sp>
+      <p:sp>
+        <p:nvSpPr>
+          <p:cNvPr id="34" name="TextBox 33"/>
+          <p:cNvSpPr txBox="1"/>
+          <p:nvPr/>
+        </p:nvSpPr>
+        <p:spPr>
+          <a:xfrm rot="1549240">
+            <a:off x="2674575" y="3308214"/>
+            <a:ext cx="657785" cy="246221"/>
+          </a:xfrm>
+          <a:prstGeom prst="rect">
+            <a:avLst/>
+          </a:prstGeom>
+          <a:noFill/>
+        </p:spPr>
+        <p:txBody>
+          <a:bodyPr wrap="square" rtlCol="0">
+            <a:spAutoFit/>
+          </a:bodyPr>
+          <a:lstStyle/>
+          <a:p>
+            <a:r>
+              <a:rPr lang="en-AU" sz="1000" dirty="0" smtClean="0"/>
+              <a:t>58kJ/kg</a:t>
+            </a:r>
+            <a:endParaRPr lang="en-AU" sz="1000" dirty="0"/>
+          </a:p>
+        </p:txBody>
+      </p:sp>
     </p:spTree>
     <p:extLst>
       <p:ext uri="{BB962C8B-B14F-4D97-AF65-F5344CB8AC3E}">
@@ -5538,7 +6251,7 @@
         </p:blipFill>
         <p:spPr bwMode="auto">
           <a:xfrm>
-            <a:off x="-108520" y="332656"/>
+            <a:off x="-159330" y="333530"/>
             <a:ext cx="9937104" cy="6832734"/>
           </a:xfrm>
           <a:prstGeom prst="rect">
@@ -5569,10 +6282,726 @@
           </a:extLst>
         </p:spPr>
       </p:pic>
+      <p:sp>
+        <p:nvSpPr>
+          <p:cNvPr id="2" name="TextBox 1"/>
+          <p:cNvSpPr txBox="1"/>
+          <p:nvPr/>
+        </p:nvSpPr>
+        <p:spPr>
+          <a:xfrm>
+            <a:off x="1403648" y="2204864"/>
+            <a:ext cx="1008112" cy="646331"/>
+          </a:xfrm>
+          <a:prstGeom prst="rect">
+            <a:avLst/>
+          </a:prstGeom>
+          <a:noFill/>
+        </p:spPr>
+        <p:txBody>
+          <a:bodyPr wrap="square" rtlCol="0">
+            <a:spAutoFit/>
+          </a:bodyPr>
+          <a:lstStyle/>
+          <a:p>
+            <a:r>
+              <a:rPr lang="en-AU" dirty="0" smtClean="0"/>
+              <a:t>Room MM.0.3</a:t>
+            </a:r>
+          </a:p>
+        </p:txBody>
+      </p:sp>
+      <p:sp>
+        <p:nvSpPr>
+          <p:cNvPr id="3" name="Oval 2"/>
+          <p:cNvSpPr/>
+          <p:nvPr/>
+        </p:nvSpPr>
+        <p:spPr>
+          <a:xfrm>
+            <a:off x="5923060" y="4085618"/>
+            <a:ext cx="45719" cy="45719"/>
+          </a:xfrm>
+          <a:prstGeom prst="ellipse">
+            <a:avLst/>
+          </a:prstGeom>
+        </p:spPr>
+        <p:style>
+          <a:lnRef idx="2">
+            <a:schemeClr val="accent1">
+              <a:shade val="50000"/>
+            </a:schemeClr>
+          </a:lnRef>
+          <a:fillRef idx="1">
+            <a:schemeClr val="accent1"/>
+          </a:fillRef>
+          <a:effectRef idx="0">
+            <a:schemeClr val="accent1"/>
+          </a:effectRef>
+          <a:fontRef idx="minor">
+            <a:schemeClr val="lt1"/>
+          </a:fontRef>
+        </p:style>
+        <p:txBody>
+          <a:bodyPr rtlCol="0" anchor="ctr"/>
+          <a:lstStyle/>
+          <a:p>
+            <a:pPr algn="ctr"/>
+            <a:endParaRPr lang="en-AU"/>
+          </a:p>
+        </p:txBody>
+      </p:sp>
+      <p:sp>
+        <p:nvSpPr>
+          <p:cNvPr id="4" name="TextBox 3"/>
+          <p:cNvSpPr txBox="1"/>
+          <p:nvPr/>
+        </p:nvSpPr>
+        <p:spPr>
+          <a:xfrm>
+            <a:off x="5618362" y="3833494"/>
+            <a:ext cx="360040" cy="261610"/>
+          </a:xfrm>
+          <a:prstGeom prst="rect">
+            <a:avLst/>
+          </a:prstGeom>
+          <a:noFill/>
+        </p:spPr>
+        <p:txBody>
+          <a:bodyPr wrap="square" rtlCol="0">
+            <a:spAutoFit/>
+          </a:bodyPr>
+          <a:lstStyle/>
+          <a:p>
+            <a:r>
+              <a:rPr lang="en-AU" sz="1100" dirty="0" smtClean="0">
+                <a:solidFill>
+                  <a:schemeClr val="tx2"/>
+                </a:solidFill>
+              </a:rPr>
+              <a:t>OA</a:t>
+            </a:r>
+            <a:endParaRPr lang="en-AU" sz="1100" dirty="0">
+              <a:solidFill>
+                <a:schemeClr val="tx2"/>
+              </a:solidFill>
+            </a:endParaRPr>
+          </a:p>
+        </p:txBody>
+      </p:sp>
+      <p:sp>
+        <p:nvSpPr>
+          <p:cNvPr id="5" name="Oval 4"/>
+          <p:cNvSpPr/>
+          <p:nvPr/>
+        </p:nvSpPr>
+        <p:spPr>
+          <a:xfrm>
+            <a:off x="4238249" y="4644590"/>
+            <a:ext cx="45719" cy="45719"/>
+          </a:xfrm>
+          <a:prstGeom prst="ellipse">
+            <a:avLst/>
+          </a:prstGeom>
+        </p:spPr>
+        <p:style>
+          <a:lnRef idx="2">
+            <a:schemeClr val="accent1">
+              <a:shade val="50000"/>
+            </a:schemeClr>
+          </a:lnRef>
+          <a:fillRef idx="1">
+            <a:schemeClr val="accent1"/>
+          </a:fillRef>
+          <a:effectRef idx="0">
+            <a:schemeClr val="accent1"/>
+          </a:effectRef>
+          <a:fontRef idx="minor">
+            <a:schemeClr val="lt1"/>
+          </a:fontRef>
+        </p:style>
+        <p:txBody>
+          <a:bodyPr rtlCol="0" anchor="ctr"/>
+          <a:lstStyle/>
+          <a:p>
+            <a:pPr algn="ctr"/>
+            <a:endParaRPr lang="en-AU"/>
+          </a:p>
+        </p:txBody>
+      </p:sp>
+      <p:sp>
+        <p:nvSpPr>
+          <p:cNvPr id="8" name="TextBox 7"/>
+          <p:cNvSpPr txBox="1"/>
+          <p:nvPr/>
+        </p:nvSpPr>
+        <p:spPr>
+          <a:xfrm>
+            <a:off x="3936261" y="4405070"/>
+            <a:ext cx="360040" cy="261610"/>
+          </a:xfrm>
+          <a:prstGeom prst="rect">
+            <a:avLst/>
+          </a:prstGeom>
+          <a:noFill/>
+        </p:spPr>
+        <p:txBody>
+          <a:bodyPr wrap="square" rtlCol="0">
+            <a:spAutoFit/>
+          </a:bodyPr>
+          <a:lstStyle/>
+          <a:p>
+            <a:r>
+              <a:rPr lang="en-AU" sz="1100" dirty="0">
+                <a:solidFill>
+                  <a:schemeClr val="tx2"/>
+                </a:solidFill>
+              </a:rPr>
+              <a:t>R</a:t>
+            </a:r>
+            <a:r>
+              <a:rPr lang="en-AU" sz="1100" dirty="0" smtClean="0">
+                <a:solidFill>
+                  <a:schemeClr val="tx2"/>
+                </a:solidFill>
+              </a:rPr>
+              <a:t>A</a:t>
+            </a:r>
+            <a:endParaRPr lang="en-AU" sz="1100" dirty="0">
+              <a:solidFill>
+                <a:schemeClr val="tx2"/>
+              </a:solidFill>
+            </a:endParaRPr>
+          </a:p>
+        </p:txBody>
+      </p:sp>
+      <p:cxnSp>
+        <p:nvCxnSpPr>
+          <p:cNvPr id="9" name="Straight Connector 8"/>
+          <p:cNvCxnSpPr/>
+          <p:nvPr/>
+        </p:nvCxnSpPr>
+        <p:spPr>
+          <a:xfrm flipV="1">
+            <a:off x="4499992" y="3833494"/>
+            <a:ext cx="4968552" cy="833187"/>
+          </a:xfrm>
+          <a:prstGeom prst="line">
+            <a:avLst/>
+          </a:prstGeom>
+        </p:spPr>
+        <p:style>
+          <a:lnRef idx="1">
+            <a:schemeClr val="accent1"/>
+          </a:lnRef>
+          <a:fillRef idx="0">
+            <a:schemeClr val="accent1"/>
+          </a:fillRef>
+          <a:effectRef idx="0">
+            <a:schemeClr val="accent1"/>
+          </a:effectRef>
+          <a:fontRef idx="minor">
+            <a:schemeClr val="tx1"/>
+          </a:fontRef>
+        </p:style>
+      </p:cxnSp>
+      <p:sp>
+        <p:nvSpPr>
+          <p:cNvPr id="11" name="TextBox 10"/>
+          <p:cNvSpPr txBox="1"/>
+          <p:nvPr/>
+        </p:nvSpPr>
+        <p:spPr>
+          <a:xfrm rot="21078338">
+            <a:off x="8685308" y="3619092"/>
+            <a:ext cx="936612" cy="261610"/>
+          </a:xfrm>
+          <a:prstGeom prst="rect">
+            <a:avLst/>
+          </a:prstGeom>
+          <a:noFill/>
+        </p:spPr>
+        <p:txBody>
+          <a:bodyPr wrap="square" rtlCol="0">
+            <a:spAutoFit/>
+          </a:bodyPr>
+          <a:lstStyle/>
+          <a:p>
+            <a:r>
+              <a:rPr lang="en-AU" sz="1100" b="1" dirty="0" smtClean="0">
+                <a:solidFill>
+                  <a:schemeClr val="tx2"/>
+                </a:solidFill>
+              </a:rPr>
+              <a:t>SHF = 0.74</a:t>
+            </a:r>
+            <a:endParaRPr lang="en-AU" sz="1100" b="1" dirty="0">
+              <a:solidFill>
+                <a:schemeClr val="tx2"/>
+              </a:solidFill>
+            </a:endParaRPr>
+          </a:p>
+        </p:txBody>
+      </p:sp>
+      <p:sp>
+        <p:nvSpPr>
+          <p:cNvPr id="16" name="Oval 15"/>
+          <p:cNvSpPr/>
+          <p:nvPr/>
+        </p:nvSpPr>
+        <p:spPr>
+          <a:xfrm>
+            <a:off x="2366041" y="4975352"/>
+            <a:ext cx="45719" cy="45719"/>
+          </a:xfrm>
+          <a:prstGeom prst="ellipse">
+            <a:avLst/>
+          </a:prstGeom>
+        </p:spPr>
+        <p:style>
+          <a:lnRef idx="2">
+            <a:schemeClr val="accent1">
+              <a:shade val="50000"/>
+            </a:schemeClr>
+          </a:lnRef>
+          <a:fillRef idx="1">
+            <a:schemeClr val="accent1"/>
+          </a:fillRef>
+          <a:effectRef idx="0">
+            <a:schemeClr val="accent1"/>
+          </a:effectRef>
+          <a:fontRef idx="minor">
+            <a:schemeClr val="lt1"/>
+          </a:fontRef>
+        </p:style>
+        <p:txBody>
+          <a:bodyPr rtlCol="0" anchor="ctr"/>
+          <a:lstStyle/>
+          <a:p>
+            <a:pPr algn="ctr"/>
+            <a:endParaRPr lang="en-AU"/>
+          </a:p>
+        </p:txBody>
+      </p:sp>
+      <p:sp>
+        <p:nvSpPr>
+          <p:cNvPr id="17" name="TextBox 16"/>
+          <p:cNvSpPr txBox="1"/>
+          <p:nvPr/>
+        </p:nvSpPr>
+        <p:spPr>
+          <a:xfrm>
+            <a:off x="2319972" y="4995369"/>
+            <a:ext cx="360040" cy="261610"/>
+          </a:xfrm>
+          <a:prstGeom prst="rect">
+            <a:avLst/>
+          </a:prstGeom>
+          <a:noFill/>
+        </p:spPr>
+        <p:txBody>
+          <a:bodyPr wrap="square" rtlCol="0">
+            <a:spAutoFit/>
+          </a:bodyPr>
+          <a:lstStyle/>
+          <a:p>
+            <a:r>
+              <a:rPr lang="en-AU" sz="1100" dirty="0">
+                <a:solidFill>
+                  <a:schemeClr val="tx2"/>
+                </a:solidFill>
+              </a:rPr>
+              <a:t>S</a:t>
+            </a:r>
+            <a:r>
+              <a:rPr lang="en-AU" sz="1100" dirty="0" smtClean="0">
+                <a:solidFill>
+                  <a:schemeClr val="tx2"/>
+                </a:solidFill>
+              </a:rPr>
+              <a:t>A</a:t>
+            </a:r>
+            <a:endParaRPr lang="en-AU" sz="1100" dirty="0">
+              <a:solidFill>
+                <a:schemeClr val="tx2"/>
+              </a:solidFill>
+            </a:endParaRPr>
+          </a:p>
+        </p:txBody>
+      </p:sp>
+      <p:cxnSp>
+        <p:nvCxnSpPr>
+          <p:cNvPr id="18" name="Straight Connector 17"/>
+          <p:cNvCxnSpPr/>
+          <p:nvPr/>
+        </p:nvCxnSpPr>
+        <p:spPr>
+          <a:xfrm flipV="1">
+            <a:off x="4275422" y="4108478"/>
+            <a:ext cx="1684811" cy="558972"/>
+          </a:xfrm>
+          <a:prstGeom prst="line">
+            <a:avLst/>
+          </a:prstGeom>
+        </p:spPr>
+        <p:style>
+          <a:lnRef idx="1">
+            <a:schemeClr val="accent2"/>
+          </a:lnRef>
+          <a:fillRef idx="0">
+            <a:schemeClr val="accent2"/>
+          </a:fillRef>
+          <a:effectRef idx="0">
+            <a:schemeClr val="accent2"/>
+          </a:effectRef>
+          <a:fontRef idx="minor">
+            <a:schemeClr val="tx1"/>
+          </a:fontRef>
+        </p:style>
+      </p:cxnSp>
+      <p:sp>
+        <p:nvSpPr>
+          <p:cNvPr id="20" name="Oval 19"/>
+          <p:cNvSpPr/>
+          <p:nvPr/>
+        </p:nvSpPr>
+        <p:spPr>
+          <a:xfrm>
+            <a:off x="4932040" y="4428566"/>
+            <a:ext cx="45719" cy="45719"/>
+          </a:xfrm>
+          <a:prstGeom prst="ellipse">
+            <a:avLst/>
+          </a:prstGeom>
+        </p:spPr>
+        <p:style>
+          <a:lnRef idx="2">
+            <a:schemeClr val="accent1">
+              <a:shade val="50000"/>
+            </a:schemeClr>
+          </a:lnRef>
+          <a:fillRef idx="1">
+            <a:schemeClr val="accent1"/>
+          </a:fillRef>
+          <a:effectRef idx="0">
+            <a:schemeClr val="accent1"/>
+          </a:effectRef>
+          <a:fontRef idx="minor">
+            <a:schemeClr val="lt1"/>
+          </a:fontRef>
+        </p:style>
+        <p:txBody>
+          <a:bodyPr rtlCol="0" anchor="ctr"/>
+          <a:lstStyle/>
+          <a:p>
+            <a:pPr algn="ctr"/>
+            <a:endParaRPr lang="en-AU"/>
+          </a:p>
+        </p:txBody>
+      </p:sp>
+      <p:sp>
+        <p:nvSpPr>
+          <p:cNvPr id="21" name="TextBox 20"/>
+          <p:cNvSpPr txBox="1"/>
+          <p:nvPr/>
+        </p:nvSpPr>
+        <p:spPr>
+          <a:xfrm>
+            <a:off x="4834422" y="4108477"/>
+            <a:ext cx="457658" cy="261610"/>
+          </a:xfrm>
+          <a:prstGeom prst="rect">
+            <a:avLst/>
+          </a:prstGeom>
+          <a:noFill/>
+        </p:spPr>
+        <p:txBody>
+          <a:bodyPr wrap="square" rtlCol="0">
+            <a:spAutoFit/>
+          </a:bodyPr>
+          <a:lstStyle/>
+          <a:p>
+            <a:r>
+              <a:rPr lang="en-AU" sz="1100" dirty="0" smtClean="0">
+                <a:solidFill>
+                  <a:schemeClr val="tx2"/>
+                </a:solidFill>
+              </a:rPr>
+              <a:t>Mix</a:t>
+            </a:r>
+            <a:endParaRPr lang="en-AU" sz="1100" dirty="0">
+              <a:solidFill>
+                <a:schemeClr val="tx2"/>
+              </a:solidFill>
+            </a:endParaRPr>
+          </a:p>
+        </p:txBody>
+      </p:sp>
+      <p:sp>
+        <p:nvSpPr>
+          <p:cNvPr id="22" name="Oval 21"/>
+          <p:cNvSpPr/>
+          <p:nvPr/>
+        </p:nvSpPr>
+        <p:spPr>
+          <a:xfrm>
+            <a:off x="2123728" y="5013176"/>
+            <a:ext cx="45719" cy="45719"/>
+          </a:xfrm>
+          <a:prstGeom prst="ellipse">
+            <a:avLst/>
+          </a:prstGeom>
+        </p:spPr>
+        <p:style>
+          <a:lnRef idx="2">
+            <a:schemeClr val="accent1">
+              <a:shade val="50000"/>
+            </a:schemeClr>
+          </a:lnRef>
+          <a:fillRef idx="1">
+            <a:schemeClr val="accent1"/>
+          </a:fillRef>
+          <a:effectRef idx="0">
+            <a:schemeClr val="accent1"/>
+          </a:effectRef>
+          <a:fontRef idx="minor">
+            <a:schemeClr val="lt1"/>
+          </a:fontRef>
+        </p:style>
+        <p:txBody>
+          <a:bodyPr rtlCol="0" anchor="ctr"/>
+          <a:lstStyle/>
+          <a:p>
+            <a:pPr algn="ctr"/>
+            <a:endParaRPr lang="en-AU"/>
+          </a:p>
+        </p:txBody>
+      </p:sp>
+      <p:sp>
+        <p:nvSpPr>
+          <p:cNvPr id="23" name="TextBox 22"/>
+          <p:cNvSpPr txBox="1"/>
+          <p:nvPr/>
+        </p:nvSpPr>
+        <p:spPr>
+          <a:xfrm>
+            <a:off x="1929073" y="5049004"/>
+            <a:ext cx="448622" cy="261610"/>
+          </a:xfrm>
+          <a:prstGeom prst="rect">
+            <a:avLst/>
+          </a:prstGeom>
+          <a:noFill/>
+        </p:spPr>
+        <p:txBody>
+          <a:bodyPr wrap="square" rtlCol="0">
+            <a:spAutoFit/>
+          </a:bodyPr>
+          <a:lstStyle/>
+          <a:p>
+            <a:r>
+              <a:rPr lang="en-AU" sz="1100" dirty="0" smtClean="0">
+                <a:solidFill>
+                  <a:schemeClr val="tx2"/>
+                </a:solidFill>
+              </a:rPr>
+              <a:t>ADP</a:t>
+            </a:r>
+            <a:endParaRPr lang="en-AU" sz="1100" dirty="0">
+              <a:solidFill>
+                <a:schemeClr val="tx2"/>
+              </a:solidFill>
+            </a:endParaRPr>
+          </a:p>
+        </p:txBody>
+      </p:sp>
+      <p:cxnSp>
+        <p:nvCxnSpPr>
+          <p:cNvPr id="28" name="Straight Connector 27"/>
+          <p:cNvCxnSpPr/>
+          <p:nvPr/>
+        </p:nvCxnSpPr>
+        <p:spPr>
+          <a:xfrm flipH="1" flipV="1">
+            <a:off x="2499992" y="3336260"/>
+            <a:ext cx="847872" cy="383318"/>
+          </a:xfrm>
+          <a:prstGeom prst="line">
+            <a:avLst/>
+          </a:prstGeom>
+        </p:spPr>
+        <p:style>
+          <a:lnRef idx="1">
+            <a:schemeClr val="accent1"/>
+          </a:lnRef>
+          <a:fillRef idx="0">
+            <a:schemeClr val="accent1"/>
+          </a:fillRef>
+          <a:effectRef idx="0">
+            <a:schemeClr val="accent1"/>
+          </a:effectRef>
+          <a:fontRef idx="minor">
+            <a:schemeClr val="tx1"/>
+          </a:fontRef>
+        </p:style>
+      </p:cxnSp>
+      <p:cxnSp>
+        <p:nvCxnSpPr>
+          <p:cNvPr id="32" name="Straight Connector 31"/>
+          <p:cNvCxnSpPr/>
+          <p:nvPr/>
+        </p:nvCxnSpPr>
+        <p:spPr>
+          <a:xfrm flipH="1" flipV="1">
+            <a:off x="1259634" y="4464732"/>
+            <a:ext cx="792086" cy="383318"/>
+          </a:xfrm>
+          <a:prstGeom prst="line">
+            <a:avLst/>
+          </a:prstGeom>
+        </p:spPr>
+        <p:style>
+          <a:lnRef idx="1">
+            <a:schemeClr val="accent1"/>
+          </a:lnRef>
+          <a:fillRef idx="0">
+            <a:schemeClr val="accent1"/>
+          </a:fillRef>
+          <a:effectRef idx="0">
+            <a:schemeClr val="accent1"/>
+          </a:effectRef>
+          <a:fontRef idx="minor">
+            <a:schemeClr val="tx1"/>
+          </a:fontRef>
+        </p:style>
+      </p:cxnSp>
+      <p:sp>
+        <p:nvSpPr>
+          <p:cNvPr id="31" name="TextBox 30"/>
+          <p:cNvSpPr txBox="1"/>
+          <p:nvPr/>
+        </p:nvSpPr>
+        <p:spPr>
+          <a:xfrm rot="1549240">
+            <a:off x="1396008" y="4412764"/>
+            <a:ext cx="657785" cy="246221"/>
+          </a:xfrm>
+          <a:prstGeom prst="rect">
+            <a:avLst/>
+          </a:prstGeom>
+          <a:noFill/>
+        </p:spPr>
+        <p:txBody>
+          <a:bodyPr wrap="square" rtlCol="0">
+            <a:spAutoFit/>
+          </a:bodyPr>
+          <a:lstStyle/>
+          <a:p>
+            <a:r>
+              <a:rPr lang="en-AU" sz="1000" dirty="0" smtClean="0"/>
+              <a:t>33kJ/kg</a:t>
+            </a:r>
+            <a:endParaRPr lang="en-AU" sz="1000" dirty="0"/>
+          </a:p>
+        </p:txBody>
+      </p:sp>
+      <p:sp>
+        <p:nvSpPr>
+          <p:cNvPr id="34" name="TextBox 33"/>
+          <p:cNvSpPr txBox="1"/>
+          <p:nvPr/>
+        </p:nvSpPr>
+        <p:spPr>
+          <a:xfrm rot="1549240">
+            <a:off x="2598776" y="3290839"/>
+            <a:ext cx="737567" cy="246221"/>
+          </a:xfrm>
+          <a:prstGeom prst="rect">
+            <a:avLst/>
+          </a:prstGeom>
+          <a:noFill/>
+        </p:spPr>
+        <p:txBody>
+          <a:bodyPr wrap="square" rtlCol="0">
+            <a:spAutoFit/>
+          </a:bodyPr>
+          <a:lstStyle/>
+          <a:p>
+            <a:r>
+              <a:rPr lang="en-AU" sz="1000" dirty="0" smtClean="0"/>
+              <a:t>57.5kJ/kg</a:t>
+            </a:r>
+            <a:endParaRPr lang="en-AU" sz="1000" dirty="0"/>
+          </a:p>
+        </p:txBody>
+      </p:sp>
+      <p:cxnSp>
+        <p:nvCxnSpPr>
+          <p:cNvPr id="25" name="Straight Connector 24"/>
+          <p:cNvCxnSpPr/>
+          <p:nvPr/>
+        </p:nvCxnSpPr>
+        <p:spPr>
+          <a:xfrm flipV="1">
+            <a:off x="1619672" y="4678775"/>
+            <a:ext cx="2647204" cy="449009"/>
+          </a:xfrm>
+          <a:prstGeom prst="line">
+            <a:avLst/>
+          </a:prstGeom>
+        </p:spPr>
+        <p:style>
+          <a:lnRef idx="1">
+            <a:schemeClr val="accent2"/>
+          </a:lnRef>
+          <a:fillRef idx="0">
+            <a:schemeClr val="accent2"/>
+          </a:fillRef>
+          <a:effectRef idx="0">
+            <a:schemeClr val="accent2"/>
+          </a:effectRef>
+          <a:fontRef idx="minor">
+            <a:schemeClr val="tx1"/>
+          </a:fontRef>
+        </p:style>
+      </p:cxnSp>
+      <p:cxnSp>
+        <p:nvCxnSpPr>
+          <p:cNvPr id="12" name="Straight Connector 11"/>
+          <p:cNvCxnSpPr>
+            <a:stCxn id="16" idx="0"/>
+            <a:endCxn id="20" idx="1"/>
+          </p:cNvCxnSpPr>
+          <p:nvPr/>
+        </p:nvCxnSpPr>
+        <p:spPr>
+          <a:xfrm flipV="1">
+            <a:off x="2388901" y="4435261"/>
+            <a:ext cx="2549834" cy="540091"/>
+          </a:xfrm>
+          <a:prstGeom prst="line">
+            <a:avLst/>
+          </a:prstGeom>
+        </p:spPr>
+        <p:style>
+          <a:lnRef idx="1">
+            <a:schemeClr val="accent2"/>
+          </a:lnRef>
+          <a:fillRef idx="0">
+            <a:schemeClr val="accent2"/>
+          </a:fillRef>
+          <a:effectRef idx="0">
+            <a:schemeClr val="accent2"/>
+          </a:effectRef>
+          <a:fontRef idx="minor">
+            <a:schemeClr val="tx1"/>
+          </a:fontRef>
+        </p:style>
+      </p:cxnSp>
     </p:spTree>
     <p:extLst>
       <p:ext uri="{BB962C8B-B14F-4D97-AF65-F5344CB8AC3E}">
-        <p14:creationId xmlns:p14="http://schemas.microsoft.com/office/powerpoint/2010/main" val="2911090702"/>
+        <p14:creationId xmlns:p14="http://schemas.microsoft.com/office/powerpoint/2010/main" val="2903780056"/>
       </p:ext>
     </p:extLst>
   </p:cSld>

</xml_diff>